<commit_message>
changing small b to B
</commit_message>
<xml_diff>
--- a/3_BSVar/2_Figures/slices.pptx
+++ b/3_BSVar/2_Figures/slices.pptx
@@ -154,7 +154,7 @@
           </a:lstStyle>
           <a:p>
             <a:r>
-              <a:rPr lang="nl-NL" smtClean="0"/>
+              <a:rPr lang="nl-NL"/>
               <a:t>Titelstijl van model bewerken</a:t>
             </a:r>
             <a:endParaRPr lang="en-US" dirty="0"/>
@@ -219,7 +219,7 @@
           </a:lstStyle>
           <a:p>
             <a:r>
-              <a:rPr lang="nl-NL" smtClean="0"/>
+              <a:rPr lang="nl-NL"/>
               <a:t>Klik om de ondertitelstijl van het model te bewerken</a:t>
             </a:r>
             <a:endParaRPr lang="en-US" dirty="0"/>
@@ -243,7 +243,7 @@
           <a:p>
             <a:fld id="{86F9D5B1-BF5D-E642-A443-AC6772FE8159}" type="datetimeFigureOut">
               <a:rPr lang="en-GB" smtClean="0"/>
-              <a:t>19/11/2018</a:t>
+              <a:t>03/06/2019</a:t>
             </a:fld>
             <a:endParaRPr lang="en-GB"/>
           </a:p>
@@ -332,7 +332,7 @@
           <a:lstStyle/>
           <a:p>
             <a:r>
-              <a:rPr lang="nl-NL" smtClean="0"/>
+              <a:rPr lang="nl-NL"/>
               <a:t>Titelstijl van model bewerken</a:t>
             </a:r>
             <a:endParaRPr lang="en-US" dirty="0"/>
@@ -356,35 +356,35 @@
           <a:p>
             <a:pPr lvl="0"/>
             <a:r>
-              <a:rPr lang="nl-NL" smtClean="0"/>
+              <a:rPr lang="nl-NL"/>
               <a:t>Klik om de tekststijl van het model te bewerken</a:t>
             </a:r>
           </a:p>
           <a:p>
             <a:pPr lvl="1"/>
             <a:r>
-              <a:rPr lang="nl-NL" smtClean="0"/>
+              <a:rPr lang="nl-NL"/>
               <a:t>Tweede niveau</a:t>
             </a:r>
           </a:p>
           <a:p>
             <a:pPr lvl="2"/>
             <a:r>
-              <a:rPr lang="nl-NL" smtClean="0"/>
+              <a:rPr lang="nl-NL"/>
               <a:t>Derde niveau</a:t>
             </a:r>
           </a:p>
           <a:p>
             <a:pPr lvl="3"/>
             <a:r>
-              <a:rPr lang="nl-NL" smtClean="0"/>
+              <a:rPr lang="nl-NL"/>
               <a:t>Vierde niveau</a:t>
             </a:r>
           </a:p>
           <a:p>
             <a:pPr lvl="4"/>
             <a:r>
-              <a:rPr lang="nl-NL" smtClean="0"/>
+              <a:rPr lang="nl-NL"/>
               <a:t>Vijfde niveau</a:t>
             </a:r>
             <a:endParaRPr lang="en-US" dirty="0"/>
@@ -408,7 +408,7 @@
           <a:p>
             <a:fld id="{86F9D5B1-BF5D-E642-A443-AC6772FE8159}" type="datetimeFigureOut">
               <a:rPr lang="en-GB" smtClean="0"/>
-              <a:t>19/11/2018</a:t>
+              <a:t>03/06/2019</a:t>
             </a:fld>
             <a:endParaRPr lang="en-GB"/>
           </a:p>
@@ -502,7 +502,7 @@
           <a:lstStyle/>
           <a:p>
             <a:r>
-              <a:rPr lang="nl-NL" smtClean="0"/>
+              <a:rPr lang="nl-NL"/>
               <a:t>Titelstijl van model bewerken</a:t>
             </a:r>
             <a:endParaRPr lang="en-US" dirty="0"/>
@@ -531,35 +531,35 @@
           <a:p>
             <a:pPr lvl="0"/>
             <a:r>
-              <a:rPr lang="nl-NL" smtClean="0"/>
+              <a:rPr lang="nl-NL"/>
               <a:t>Klik om de tekststijl van het model te bewerken</a:t>
             </a:r>
           </a:p>
           <a:p>
             <a:pPr lvl="1"/>
             <a:r>
-              <a:rPr lang="nl-NL" smtClean="0"/>
+              <a:rPr lang="nl-NL"/>
               <a:t>Tweede niveau</a:t>
             </a:r>
           </a:p>
           <a:p>
             <a:pPr lvl="2"/>
             <a:r>
-              <a:rPr lang="nl-NL" smtClean="0"/>
+              <a:rPr lang="nl-NL"/>
               <a:t>Derde niveau</a:t>
             </a:r>
           </a:p>
           <a:p>
             <a:pPr lvl="3"/>
             <a:r>
-              <a:rPr lang="nl-NL" smtClean="0"/>
+              <a:rPr lang="nl-NL"/>
               <a:t>Vierde niveau</a:t>
             </a:r>
           </a:p>
           <a:p>
             <a:pPr lvl="4"/>
             <a:r>
-              <a:rPr lang="nl-NL" smtClean="0"/>
+              <a:rPr lang="nl-NL"/>
               <a:t>Vijfde niveau</a:t>
             </a:r>
             <a:endParaRPr lang="en-US" dirty="0"/>
@@ -583,7 +583,7 @@
           <a:p>
             <a:fld id="{86F9D5B1-BF5D-E642-A443-AC6772FE8159}" type="datetimeFigureOut">
               <a:rPr lang="en-GB" smtClean="0"/>
-              <a:t>19/11/2018</a:t>
+              <a:t>03/06/2019</a:t>
             </a:fld>
             <a:endParaRPr lang="en-GB"/>
           </a:p>
@@ -672,7 +672,7 @@
           <a:lstStyle/>
           <a:p>
             <a:r>
-              <a:rPr lang="nl-NL" smtClean="0"/>
+              <a:rPr lang="nl-NL"/>
               <a:t>Titelstijl van model bewerken</a:t>
             </a:r>
             <a:endParaRPr lang="en-US" dirty="0"/>
@@ -696,35 +696,35 @@
           <a:p>
             <a:pPr lvl="0"/>
             <a:r>
-              <a:rPr lang="nl-NL" smtClean="0"/>
+              <a:rPr lang="nl-NL"/>
               <a:t>Klik om de tekststijl van het model te bewerken</a:t>
             </a:r>
           </a:p>
           <a:p>
             <a:pPr lvl="1"/>
             <a:r>
-              <a:rPr lang="nl-NL" smtClean="0"/>
+              <a:rPr lang="nl-NL"/>
               <a:t>Tweede niveau</a:t>
             </a:r>
           </a:p>
           <a:p>
             <a:pPr lvl="2"/>
             <a:r>
-              <a:rPr lang="nl-NL" smtClean="0"/>
+              <a:rPr lang="nl-NL"/>
               <a:t>Derde niveau</a:t>
             </a:r>
           </a:p>
           <a:p>
             <a:pPr lvl="3"/>
             <a:r>
-              <a:rPr lang="nl-NL" smtClean="0"/>
+              <a:rPr lang="nl-NL"/>
               <a:t>Vierde niveau</a:t>
             </a:r>
           </a:p>
           <a:p>
             <a:pPr lvl="4"/>
             <a:r>
-              <a:rPr lang="nl-NL" smtClean="0"/>
+              <a:rPr lang="nl-NL"/>
               <a:t>Vijfde niveau</a:t>
             </a:r>
             <a:endParaRPr lang="en-US" dirty="0"/>
@@ -748,7 +748,7 @@
           <a:p>
             <a:fld id="{86F9D5B1-BF5D-E642-A443-AC6772FE8159}" type="datetimeFigureOut">
               <a:rPr lang="en-GB" smtClean="0"/>
-              <a:t>19/11/2018</a:t>
+              <a:t>03/06/2019</a:t>
             </a:fld>
             <a:endParaRPr lang="en-GB"/>
           </a:p>
@@ -846,7 +846,7 @@
           </a:lstStyle>
           <a:p>
             <a:r>
-              <a:rPr lang="nl-NL" smtClean="0"/>
+              <a:rPr lang="nl-NL"/>
               <a:t>Titelstijl van model bewerken</a:t>
             </a:r>
             <a:endParaRPr lang="en-US" dirty="0"/>
@@ -966,7 +966,7 @@
           <a:p>
             <a:pPr lvl="0"/>
             <a:r>
-              <a:rPr lang="nl-NL" smtClean="0"/>
+              <a:rPr lang="nl-NL"/>
               <a:t>Klik om de tekststijl van het model te bewerken</a:t>
             </a:r>
           </a:p>
@@ -989,7 +989,7 @@
           <a:p>
             <a:fld id="{86F9D5B1-BF5D-E642-A443-AC6772FE8159}" type="datetimeFigureOut">
               <a:rPr lang="en-GB" smtClean="0"/>
-              <a:t>19/11/2018</a:t>
+              <a:t>03/06/2019</a:t>
             </a:fld>
             <a:endParaRPr lang="en-GB"/>
           </a:p>
@@ -1078,7 +1078,7 @@
           <a:lstStyle/>
           <a:p>
             <a:r>
-              <a:rPr lang="nl-NL" smtClean="0"/>
+              <a:rPr lang="nl-NL"/>
               <a:t>Titelstijl van model bewerken</a:t>
             </a:r>
             <a:endParaRPr lang="en-US" dirty="0"/>
@@ -1107,35 +1107,35 @@
           <a:p>
             <a:pPr lvl="0"/>
             <a:r>
-              <a:rPr lang="nl-NL" smtClean="0"/>
+              <a:rPr lang="nl-NL"/>
               <a:t>Klik om de tekststijl van het model te bewerken</a:t>
             </a:r>
           </a:p>
           <a:p>
             <a:pPr lvl="1"/>
             <a:r>
-              <a:rPr lang="nl-NL" smtClean="0"/>
+              <a:rPr lang="nl-NL"/>
               <a:t>Tweede niveau</a:t>
             </a:r>
           </a:p>
           <a:p>
             <a:pPr lvl="2"/>
             <a:r>
-              <a:rPr lang="nl-NL" smtClean="0"/>
+              <a:rPr lang="nl-NL"/>
               <a:t>Derde niveau</a:t>
             </a:r>
           </a:p>
           <a:p>
             <a:pPr lvl="3"/>
             <a:r>
-              <a:rPr lang="nl-NL" smtClean="0"/>
+              <a:rPr lang="nl-NL"/>
               <a:t>Vierde niveau</a:t>
             </a:r>
           </a:p>
           <a:p>
             <a:pPr lvl="4"/>
             <a:r>
-              <a:rPr lang="nl-NL" smtClean="0"/>
+              <a:rPr lang="nl-NL"/>
               <a:t>Vijfde niveau</a:t>
             </a:r>
             <a:endParaRPr lang="en-US" dirty="0"/>
@@ -1164,35 +1164,35 @@
           <a:p>
             <a:pPr lvl="0"/>
             <a:r>
-              <a:rPr lang="nl-NL" smtClean="0"/>
+              <a:rPr lang="nl-NL"/>
               <a:t>Klik om de tekststijl van het model te bewerken</a:t>
             </a:r>
           </a:p>
           <a:p>
             <a:pPr lvl="1"/>
             <a:r>
-              <a:rPr lang="nl-NL" smtClean="0"/>
+              <a:rPr lang="nl-NL"/>
               <a:t>Tweede niveau</a:t>
             </a:r>
           </a:p>
           <a:p>
             <a:pPr lvl="2"/>
             <a:r>
-              <a:rPr lang="nl-NL" smtClean="0"/>
+              <a:rPr lang="nl-NL"/>
               <a:t>Derde niveau</a:t>
             </a:r>
           </a:p>
           <a:p>
             <a:pPr lvl="3"/>
             <a:r>
-              <a:rPr lang="nl-NL" smtClean="0"/>
+              <a:rPr lang="nl-NL"/>
               <a:t>Vierde niveau</a:t>
             </a:r>
           </a:p>
           <a:p>
             <a:pPr lvl="4"/>
             <a:r>
-              <a:rPr lang="nl-NL" smtClean="0"/>
+              <a:rPr lang="nl-NL"/>
               <a:t>Vijfde niveau</a:t>
             </a:r>
             <a:endParaRPr lang="en-US" dirty="0"/>
@@ -1216,7 +1216,7 @@
           <a:p>
             <a:fld id="{86F9D5B1-BF5D-E642-A443-AC6772FE8159}" type="datetimeFigureOut">
               <a:rPr lang="en-GB" smtClean="0"/>
-              <a:t>19/11/2018</a:t>
+              <a:t>03/06/2019</a:t>
             </a:fld>
             <a:endParaRPr lang="en-GB"/>
           </a:p>
@@ -1310,7 +1310,7 @@
           <a:lstStyle/>
           <a:p>
             <a:r>
-              <a:rPr lang="nl-NL" smtClean="0"/>
+              <a:rPr lang="nl-NL"/>
               <a:t>Titelstijl van model bewerken</a:t>
             </a:r>
             <a:endParaRPr lang="en-US" dirty="0"/>
@@ -1376,7 +1376,7 @@
           <a:p>
             <a:pPr lvl="0"/>
             <a:r>
-              <a:rPr lang="nl-NL" smtClean="0"/>
+              <a:rPr lang="nl-NL"/>
               <a:t>Klik om de tekststijl van het model te bewerken</a:t>
             </a:r>
           </a:p>
@@ -1404,35 +1404,35 @@
           <a:p>
             <a:pPr lvl="0"/>
             <a:r>
-              <a:rPr lang="nl-NL" smtClean="0"/>
+              <a:rPr lang="nl-NL"/>
               <a:t>Klik om de tekststijl van het model te bewerken</a:t>
             </a:r>
           </a:p>
           <a:p>
             <a:pPr lvl="1"/>
             <a:r>
-              <a:rPr lang="nl-NL" smtClean="0"/>
+              <a:rPr lang="nl-NL"/>
               <a:t>Tweede niveau</a:t>
             </a:r>
           </a:p>
           <a:p>
             <a:pPr lvl="2"/>
             <a:r>
-              <a:rPr lang="nl-NL" smtClean="0"/>
+              <a:rPr lang="nl-NL"/>
               <a:t>Derde niveau</a:t>
             </a:r>
           </a:p>
           <a:p>
             <a:pPr lvl="3"/>
             <a:r>
-              <a:rPr lang="nl-NL" smtClean="0"/>
+              <a:rPr lang="nl-NL"/>
               <a:t>Vierde niveau</a:t>
             </a:r>
           </a:p>
           <a:p>
             <a:pPr lvl="4"/>
             <a:r>
-              <a:rPr lang="nl-NL" smtClean="0"/>
+              <a:rPr lang="nl-NL"/>
               <a:t>Vijfde niveau</a:t>
             </a:r>
             <a:endParaRPr lang="en-US" dirty="0"/>
@@ -1498,7 +1498,7 @@
           <a:p>
             <a:pPr lvl="0"/>
             <a:r>
-              <a:rPr lang="nl-NL" smtClean="0"/>
+              <a:rPr lang="nl-NL"/>
               <a:t>Klik om de tekststijl van het model te bewerken</a:t>
             </a:r>
           </a:p>
@@ -1526,35 +1526,35 @@
           <a:p>
             <a:pPr lvl="0"/>
             <a:r>
-              <a:rPr lang="nl-NL" smtClean="0"/>
+              <a:rPr lang="nl-NL"/>
               <a:t>Klik om de tekststijl van het model te bewerken</a:t>
             </a:r>
           </a:p>
           <a:p>
             <a:pPr lvl="1"/>
             <a:r>
-              <a:rPr lang="nl-NL" smtClean="0"/>
+              <a:rPr lang="nl-NL"/>
               <a:t>Tweede niveau</a:t>
             </a:r>
           </a:p>
           <a:p>
             <a:pPr lvl="2"/>
             <a:r>
-              <a:rPr lang="nl-NL" smtClean="0"/>
+              <a:rPr lang="nl-NL"/>
               <a:t>Derde niveau</a:t>
             </a:r>
           </a:p>
           <a:p>
             <a:pPr lvl="3"/>
             <a:r>
-              <a:rPr lang="nl-NL" smtClean="0"/>
+              <a:rPr lang="nl-NL"/>
               <a:t>Vierde niveau</a:t>
             </a:r>
           </a:p>
           <a:p>
             <a:pPr lvl="4"/>
             <a:r>
-              <a:rPr lang="nl-NL" smtClean="0"/>
+              <a:rPr lang="nl-NL"/>
               <a:t>Vijfde niveau</a:t>
             </a:r>
             <a:endParaRPr lang="en-US" dirty="0"/>
@@ -1578,7 +1578,7 @@
           <a:p>
             <a:fld id="{86F9D5B1-BF5D-E642-A443-AC6772FE8159}" type="datetimeFigureOut">
               <a:rPr lang="en-GB" smtClean="0"/>
-              <a:t>19/11/2018</a:t>
+              <a:t>03/06/2019</a:t>
             </a:fld>
             <a:endParaRPr lang="en-GB"/>
           </a:p>
@@ -1667,7 +1667,7 @@
           <a:lstStyle/>
           <a:p>
             <a:r>
-              <a:rPr lang="nl-NL" smtClean="0"/>
+              <a:rPr lang="nl-NL"/>
               <a:t>Titelstijl van model bewerken</a:t>
             </a:r>
             <a:endParaRPr lang="en-US" dirty="0"/>
@@ -1691,7 +1691,7 @@
           <a:p>
             <a:fld id="{86F9D5B1-BF5D-E642-A443-AC6772FE8159}" type="datetimeFigureOut">
               <a:rPr lang="en-GB" smtClean="0"/>
-              <a:t>19/11/2018</a:t>
+              <a:t>03/06/2019</a:t>
             </a:fld>
             <a:endParaRPr lang="en-GB"/>
           </a:p>
@@ -1781,7 +1781,7 @@
           <a:p>
             <a:fld id="{86F9D5B1-BF5D-E642-A443-AC6772FE8159}" type="datetimeFigureOut">
               <a:rPr lang="en-GB" smtClean="0"/>
-              <a:t>19/11/2018</a:t>
+              <a:t>03/06/2019</a:t>
             </a:fld>
             <a:endParaRPr lang="en-GB"/>
           </a:p>
@@ -1879,7 +1879,7 @@
           </a:lstStyle>
           <a:p>
             <a:r>
-              <a:rPr lang="nl-NL" smtClean="0"/>
+              <a:rPr lang="nl-NL"/>
               <a:t>Titelstijl van model bewerken</a:t>
             </a:r>
             <a:endParaRPr lang="en-US" dirty="0"/>
@@ -1936,35 +1936,35 @@
           <a:p>
             <a:pPr lvl="0"/>
             <a:r>
-              <a:rPr lang="nl-NL" smtClean="0"/>
+              <a:rPr lang="nl-NL"/>
               <a:t>Klik om de tekststijl van het model te bewerken</a:t>
             </a:r>
           </a:p>
           <a:p>
             <a:pPr lvl="1"/>
             <a:r>
-              <a:rPr lang="nl-NL" smtClean="0"/>
+              <a:rPr lang="nl-NL"/>
               <a:t>Tweede niveau</a:t>
             </a:r>
           </a:p>
           <a:p>
             <a:pPr lvl="2"/>
             <a:r>
-              <a:rPr lang="nl-NL" smtClean="0"/>
+              <a:rPr lang="nl-NL"/>
               <a:t>Derde niveau</a:t>
             </a:r>
           </a:p>
           <a:p>
             <a:pPr lvl="3"/>
             <a:r>
-              <a:rPr lang="nl-NL" smtClean="0"/>
+              <a:rPr lang="nl-NL"/>
               <a:t>Vierde niveau</a:t>
             </a:r>
           </a:p>
           <a:p>
             <a:pPr lvl="4"/>
             <a:r>
-              <a:rPr lang="nl-NL" smtClean="0"/>
+              <a:rPr lang="nl-NL"/>
               <a:t>Vijfde niveau</a:t>
             </a:r>
             <a:endParaRPr lang="en-US" dirty="0"/>
@@ -2030,7 +2030,7 @@
           <a:p>
             <a:pPr lvl="0"/>
             <a:r>
-              <a:rPr lang="nl-NL" smtClean="0"/>
+              <a:rPr lang="nl-NL"/>
               <a:t>Klik om de tekststijl van het model te bewerken</a:t>
             </a:r>
           </a:p>
@@ -2053,7 +2053,7 @@
           <a:p>
             <a:fld id="{86F9D5B1-BF5D-E642-A443-AC6772FE8159}" type="datetimeFigureOut">
               <a:rPr lang="en-GB" smtClean="0"/>
-              <a:t>19/11/2018</a:t>
+              <a:t>03/06/2019</a:t>
             </a:fld>
             <a:endParaRPr lang="en-GB"/>
           </a:p>
@@ -2151,7 +2151,7 @@
           </a:lstStyle>
           <a:p>
             <a:r>
-              <a:rPr lang="nl-NL" smtClean="0"/>
+              <a:rPr lang="nl-NL"/>
               <a:t>Titelstijl van model bewerken</a:t>
             </a:r>
             <a:endParaRPr lang="en-US" dirty="0"/>
@@ -2216,7 +2216,7 @@
           </a:lstStyle>
           <a:p>
             <a:r>
-              <a:rPr lang="nl-NL" smtClean="0"/>
+              <a:rPr lang="nl-NL"/>
               <a:t>Sleep de afbeelding naar de tijdelijke aanduiding of klik op het pictogram als u een afbeelding wilt toevoegen</a:t>
             </a:r>
             <a:endParaRPr lang="en-US" dirty="0"/>
@@ -2282,7 +2282,7 @@
           <a:p>
             <a:pPr lvl="0"/>
             <a:r>
-              <a:rPr lang="nl-NL" smtClean="0"/>
+              <a:rPr lang="nl-NL"/>
               <a:t>Klik om de tekststijl van het model te bewerken</a:t>
             </a:r>
           </a:p>
@@ -2305,7 +2305,7 @@
           <a:p>
             <a:fld id="{86F9D5B1-BF5D-E642-A443-AC6772FE8159}" type="datetimeFigureOut">
               <a:rPr lang="en-GB" smtClean="0"/>
-              <a:t>19/11/2018</a:t>
+              <a:t>03/06/2019</a:t>
             </a:fld>
             <a:endParaRPr lang="en-GB"/>
           </a:p>
@@ -2409,7 +2409,7 @@
           <a:lstStyle/>
           <a:p>
             <a:r>
-              <a:rPr lang="nl-NL" smtClean="0"/>
+              <a:rPr lang="nl-NL"/>
               <a:t>Titelstijl van model bewerken</a:t>
             </a:r>
             <a:endParaRPr lang="en-US" dirty="0"/>
@@ -2443,35 +2443,35 @@
           <a:p>
             <a:pPr lvl="0"/>
             <a:r>
-              <a:rPr lang="nl-NL" smtClean="0"/>
+              <a:rPr lang="nl-NL"/>
               <a:t>Klik om de tekststijl van het model te bewerken</a:t>
             </a:r>
           </a:p>
           <a:p>
             <a:pPr lvl="1"/>
             <a:r>
-              <a:rPr lang="nl-NL" smtClean="0"/>
+              <a:rPr lang="nl-NL"/>
               <a:t>Tweede niveau</a:t>
             </a:r>
           </a:p>
           <a:p>
             <a:pPr lvl="2"/>
             <a:r>
-              <a:rPr lang="nl-NL" smtClean="0"/>
+              <a:rPr lang="nl-NL"/>
               <a:t>Derde niveau</a:t>
             </a:r>
           </a:p>
           <a:p>
             <a:pPr lvl="3"/>
             <a:r>
-              <a:rPr lang="nl-NL" smtClean="0"/>
+              <a:rPr lang="nl-NL"/>
               <a:t>Vierde niveau</a:t>
             </a:r>
           </a:p>
           <a:p>
             <a:pPr lvl="4"/>
             <a:r>
-              <a:rPr lang="nl-NL" smtClean="0"/>
+              <a:rPr lang="nl-NL"/>
               <a:t>Vijfde niveau</a:t>
             </a:r>
             <a:endParaRPr lang="en-US" dirty="0"/>
@@ -2513,7 +2513,7 @@
           <a:p>
             <a:fld id="{86F9D5B1-BF5D-E642-A443-AC6772FE8159}" type="datetimeFigureOut">
               <a:rPr lang="en-GB" smtClean="0"/>
-              <a:t>19/11/2018</a:t>
+              <a:t>03/06/2019</a:t>
             </a:fld>
             <a:endParaRPr lang="en-GB"/>
           </a:p>
@@ -3002,7 +3002,7 @@
           <a:p>
             <a:r>
               <a:rPr lang="en-GB" sz="1000" dirty="0"/>
-              <a:t>observed effect (b*)</a:t>
+              <a:t>observed effect (B*)</a:t>
             </a:r>
           </a:p>
         </p:txBody>
@@ -3041,7 +3041,7 @@
                       <m:sSubSupPr>
                         <m:ctrlPr>
                           <a:rPr lang="en-US" sz="1000" i="1">
-                            <a:latin typeface="Cambria Math" charset="0"/>
+                            <a:latin typeface="Cambria Math" panose="02040503050406030204" pitchFamily="18" charset="0"/>
                           </a:rPr>
                         </m:ctrlPr>
                       </m:sSubSupPr>

</xml_diff>